<commit_message>
ppt inhalt verfasst (unvollständig)
</commit_message>
<xml_diff>
--- a/doc/task14/Task14.pptx
+++ b/doc/task14/Task14.pptx
@@ -5,12 +5,14 @@
     <p:sldMasterId id="2147483648" r:id="rId1"/>
   </p:sldMasterIdLst>
   <p:notesMasterIdLst>
-    <p:notesMasterId r:id="rId5"/>
+    <p:notesMasterId r:id="rId7"/>
   </p:notesMasterIdLst>
   <p:sldIdLst>
     <p:sldId id="270" r:id="rId2"/>
     <p:sldId id="271" r:id="rId3"/>
-    <p:sldId id="269" r:id="rId4"/>
+    <p:sldId id="272" r:id="rId4"/>
+    <p:sldId id="273" r:id="rId5"/>
+    <p:sldId id="269" r:id="rId6"/>
   </p:sldIdLst>
   <p:sldSz cx="12192000" cy="6858000"/>
   <p:notesSz cx="6858000" cy="9144000"/>
@@ -211,7 +213,7 @@
             <a:fld id="{5C5501F6-625D-4440-BFE5-621C0F40DF81}" type="datetimeFigureOut">
               <a:rPr lang="de-DE" smtClean="0"/>
               <a:pPr/>
-              <a:t>19.10.2015</a:t>
+              <a:t>19.01.2016</a:t>
             </a:fld>
             <a:endParaRPr lang="de-CH"/>
           </a:p>
@@ -614,7 +616,7 @@
             <a:fld id="{B815E98A-0D5B-4172-A8C9-1641F3C9D774}" type="datetimeFigureOut">
               <a:rPr lang="de-CH" smtClean="0"/>
               <a:pPr/>
-              <a:t>19.10.2015</a:t>
+              <a:t>19.01.2016</a:t>
             </a:fld>
             <a:endParaRPr lang="de-CH"/>
           </a:p>
@@ -786,7 +788,7 @@
             <a:fld id="{B815E98A-0D5B-4172-A8C9-1641F3C9D774}" type="datetimeFigureOut">
               <a:rPr lang="de-CH" smtClean="0"/>
               <a:pPr/>
-              <a:t>19.10.2015</a:t>
+              <a:t>19.01.2016</a:t>
             </a:fld>
             <a:endParaRPr lang="de-CH"/>
           </a:p>
@@ -968,7 +970,7 @@
             <a:fld id="{B815E98A-0D5B-4172-A8C9-1641F3C9D774}" type="datetimeFigureOut">
               <a:rPr lang="de-CH" smtClean="0"/>
               <a:pPr/>
-              <a:t>19.10.2015</a:t>
+              <a:t>19.01.2016</a:t>
             </a:fld>
             <a:endParaRPr lang="de-CH"/>
           </a:p>
@@ -1140,7 +1142,7 @@
             <a:fld id="{B815E98A-0D5B-4172-A8C9-1641F3C9D774}" type="datetimeFigureOut">
               <a:rPr lang="de-CH" smtClean="0"/>
               <a:pPr/>
-              <a:t>19.10.2015</a:t>
+              <a:t>19.01.2016</a:t>
             </a:fld>
             <a:endParaRPr lang="de-CH"/>
           </a:p>
@@ -1388,7 +1390,7 @@
             <a:fld id="{B815E98A-0D5B-4172-A8C9-1641F3C9D774}" type="datetimeFigureOut">
               <a:rPr lang="de-CH" smtClean="0"/>
               <a:pPr/>
-              <a:t>19.10.2015</a:t>
+              <a:t>19.01.2016</a:t>
             </a:fld>
             <a:endParaRPr lang="de-CH"/>
           </a:p>
@@ -1622,7 +1624,7 @@
             <a:fld id="{B815E98A-0D5B-4172-A8C9-1641F3C9D774}" type="datetimeFigureOut">
               <a:rPr lang="de-CH" smtClean="0"/>
               <a:pPr/>
-              <a:t>19.10.2015</a:t>
+              <a:t>19.01.2016</a:t>
             </a:fld>
             <a:endParaRPr lang="de-CH"/>
           </a:p>
@@ -1991,7 +1993,7 @@
             <a:fld id="{B815E98A-0D5B-4172-A8C9-1641F3C9D774}" type="datetimeFigureOut">
               <a:rPr lang="de-CH" smtClean="0"/>
               <a:pPr/>
-              <a:t>19.10.2015</a:t>
+              <a:t>19.01.2016</a:t>
             </a:fld>
             <a:endParaRPr lang="de-CH"/>
           </a:p>
@@ -2111,7 +2113,7 @@
             <a:fld id="{B815E98A-0D5B-4172-A8C9-1641F3C9D774}" type="datetimeFigureOut">
               <a:rPr lang="de-CH" smtClean="0"/>
               <a:pPr/>
-              <a:t>19.10.2015</a:t>
+              <a:t>19.01.2016</a:t>
             </a:fld>
             <a:endParaRPr lang="de-CH"/>
           </a:p>
@@ -2208,7 +2210,7 @@
             <a:fld id="{B815E98A-0D5B-4172-A8C9-1641F3C9D774}" type="datetimeFigureOut">
               <a:rPr lang="de-CH" smtClean="0"/>
               <a:pPr/>
-              <a:t>19.10.2015</a:t>
+              <a:t>19.01.2016</a:t>
             </a:fld>
             <a:endParaRPr lang="de-CH"/>
           </a:p>
@@ -2487,7 +2489,7 @@
             <a:fld id="{B815E98A-0D5B-4172-A8C9-1641F3C9D774}" type="datetimeFigureOut">
               <a:rPr lang="de-CH" smtClean="0"/>
               <a:pPr/>
-              <a:t>19.10.2015</a:t>
+              <a:t>19.01.2016</a:t>
             </a:fld>
             <a:endParaRPr lang="de-CH"/>
           </a:p>
@@ -2742,7 +2744,7 @@
             <a:fld id="{B815E98A-0D5B-4172-A8C9-1641F3C9D774}" type="datetimeFigureOut">
               <a:rPr lang="de-CH" smtClean="0"/>
               <a:pPr/>
-              <a:t>19.10.2015</a:t>
+              <a:t>19.01.2016</a:t>
             </a:fld>
             <a:endParaRPr lang="de-CH"/>
           </a:p>
@@ -2957,7 +2959,7 @@
             <a:fld id="{B815E98A-0D5B-4172-A8C9-1641F3C9D774}" type="datetimeFigureOut">
               <a:rPr lang="de-CH" smtClean="0"/>
               <a:pPr/>
-              <a:t>19.10.2015</a:t>
+              <a:t>19.01.2016</a:t>
             </a:fld>
             <a:endParaRPr lang="de-CH"/>
           </a:p>
@@ -3557,9 +3559,14 @@
           <a:p>
             <a:pPr lvl="1"/>
             <a:r>
-              <a:rPr lang="de-CH" dirty="0"/>
-              <a:t>Mainfeatures</a:t>
-            </a:r>
+              <a:rPr lang="de-CH" dirty="0" smtClean="0"/>
+              <a:t>Main </a:t>
+            </a:r>
+            <a:r>
+              <a:rPr lang="de-CH" dirty="0" err="1" smtClean="0"/>
+              <a:t>features</a:t>
+            </a:r>
+            <a:endParaRPr lang="de-CH" dirty="0"/>
           </a:p>
           <a:p>
             <a:pPr lvl="1"/>
@@ -3655,6 +3662,343 @@
           <a:lstStyle/>
           <a:p>
             <a:r>
+              <a:rPr lang="de-CH" b="1" dirty="0" err="1" smtClean="0">
+                <a:solidFill>
+                  <a:srgbClr val="00B050"/>
+                </a:solidFill>
+              </a:rPr>
+              <a:t>Scoping</a:t>
+            </a:r>
+            <a:endParaRPr lang="de-CH" dirty="0"/>
+          </a:p>
+        </p:txBody>
+      </p:sp>
+      <p:sp>
+        <p:nvSpPr>
+          <p:cNvPr id="3" name="Inhaltsplatzhalter 2"/>
+          <p:cNvSpPr>
+            <a:spLocks noGrp="1"/>
+          </p:cNvSpPr>
+          <p:nvPr>
+            <p:ph idx="1"/>
+          </p:nvPr>
+        </p:nvSpPr>
+        <p:spPr/>
+        <p:txBody>
+          <a:bodyPr>
+            <a:normAutofit/>
+          </a:bodyPr>
+          <a:lstStyle/>
+          <a:p>
+            <a:r>
+              <a:rPr lang="de-CH" dirty="0" smtClean="0"/>
+              <a:t>Patient </a:t>
+            </a:r>
+            <a:r>
+              <a:rPr lang="de-CH" dirty="0" err="1" smtClean="0"/>
+              <a:t>management</a:t>
+            </a:r>
+            <a:r>
+              <a:rPr lang="de-CH" dirty="0" smtClean="0"/>
+              <a:t> </a:t>
+            </a:r>
+            <a:r>
+              <a:rPr lang="de-CH" dirty="0" err="1" smtClean="0"/>
+              <a:t>app</a:t>
+            </a:r>
+            <a:r>
+              <a:rPr lang="de-CH" dirty="0" smtClean="0"/>
+              <a:t> </a:t>
+            </a:r>
+            <a:r>
+              <a:rPr lang="de-CH" dirty="0" err="1" smtClean="0"/>
+              <a:t>for</a:t>
+            </a:r>
+            <a:r>
+              <a:rPr lang="de-CH" dirty="0" smtClean="0"/>
+              <a:t> </a:t>
+            </a:r>
+            <a:r>
+              <a:rPr lang="de-CH" dirty="0" err="1" smtClean="0"/>
+              <a:t>physicians</a:t>
+            </a:r>
+            <a:endParaRPr lang="de-CH" dirty="0" smtClean="0"/>
+          </a:p>
+          <a:p>
+            <a:r>
+              <a:rPr lang="de-CH" dirty="0" smtClean="0"/>
+              <a:t>Open </a:t>
+            </a:r>
+            <a:r>
+              <a:rPr lang="de-CH" dirty="0" err="1" smtClean="0"/>
+              <a:t>given</a:t>
+            </a:r>
+            <a:r>
+              <a:rPr lang="de-CH" dirty="0" smtClean="0"/>
+              <a:t> </a:t>
+            </a:r>
+            <a:r>
+              <a:rPr lang="de-CH" dirty="0" err="1" smtClean="0"/>
+              <a:t>appointments</a:t>
+            </a:r>
+            <a:endParaRPr lang="de-CH" dirty="0" smtClean="0"/>
+          </a:p>
+          <a:p>
+            <a:r>
+              <a:rPr lang="de-CH" dirty="0" err="1" smtClean="0"/>
+              <a:t>Collect</a:t>
+            </a:r>
+            <a:r>
+              <a:rPr lang="de-CH" dirty="0" smtClean="0"/>
+              <a:t> </a:t>
+            </a:r>
+            <a:r>
+              <a:rPr lang="de-CH" dirty="0" err="1" smtClean="0"/>
+              <a:t>or</a:t>
+            </a:r>
+            <a:r>
+              <a:rPr lang="de-CH" dirty="0" smtClean="0"/>
+              <a:t> </a:t>
+            </a:r>
+            <a:r>
+              <a:rPr lang="de-CH" dirty="0" err="1" smtClean="0"/>
+              <a:t>change</a:t>
+            </a:r>
+            <a:r>
+              <a:rPr lang="de-CH" dirty="0" smtClean="0"/>
+              <a:t> </a:t>
+            </a:r>
+            <a:r>
+              <a:rPr lang="de-CH" dirty="0" err="1" smtClean="0"/>
+              <a:t>date</a:t>
+            </a:r>
+            <a:r>
+              <a:rPr lang="de-CH" dirty="0" smtClean="0"/>
+              <a:t> </a:t>
+            </a:r>
+            <a:r>
+              <a:rPr lang="de-CH" dirty="0" err="1" smtClean="0"/>
+              <a:t>of</a:t>
+            </a:r>
+            <a:r>
+              <a:rPr lang="de-CH" dirty="0" smtClean="0"/>
+              <a:t> </a:t>
+            </a:r>
+            <a:r>
+              <a:rPr lang="de-CH" dirty="0" err="1" smtClean="0"/>
+              <a:t>patient</a:t>
+            </a:r>
+            <a:endParaRPr lang="de-CH" dirty="0" smtClean="0"/>
+          </a:p>
+          <a:p>
+            <a:r>
+              <a:rPr lang="de-CH" dirty="0" err="1" smtClean="0"/>
+              <a:t>Define</a:t>
+            </a:r>
+            <a:r>
+              <a:rPr lang="de-CH" dirty="0" smtClean="0"/>
+              <a:t> </a:t>
+            </a:r>
+            <a:r>
+              <a:rPr lang="de-CH" dirty="0" err="1" smtClean="0"/>
+              <a:t>new</a:t>
+            </a:r>
+            <a:r>
+              <a:rPr lang="de-CH" dirty="0" smtClean="0"/>
+              <a:t> </a:t>
+            </a:r>
+            <a:r>
+              <a:rPr lang="de-CH" dirty="0" err="1" smtClean="0"/>
+              <a:t>treatment</a:t>
+            </a:r>
+            <a:r>
+              <a:rPr lang="de-CH" dirty="0" smtClean="0"/>
+              <a:t> </a:t>
+            </a:r>
+            <a:r>
+              <a:rPr lang="de-CH" dirty="0" err="1" smtClean="0"/>
+              <a:t>plans</a:t>
+            </a:r>
+            <a:r>
+              <a:rPr lang="de-CH" dirty="0" smtClean="0"/>
+              <a:t> </a:t>
+            </a:r>
+            <a:endParaRPr lang="de-CH" dirty="0" smtClean="0"/>
+          </a:p>
+        </p:txBody>
+      </p:sp>
+    </p:spTree>
+    <p:extLst>
+      <p:ext uri="{BB962C8B-B14F-4D97-AF65-F5344CB8AC3E}">
+        <p14:creationId xmlns:p14="http://schemas.microsoft.com/office/powerpoint/2010/main" val="1592215552"/>
+      </p:ext>
+    </p:extLst>
+  </p:cSld>
+  <p:clrMapOvr>
+    <a:masterClrMapping/>
+  </p:clrMapOvr>
+  <p:timing>
+    <p:tnLst>
+      <p:par>
+        <p:cTn id="1" dur="indefinite" restart="never" nodeType="tmRoot"/>
+      </p:par>
+    </p:tnLst>
+  </p:timing>
+</p:sld>
+</file>
+
+<file path=ppt/slides/slide4.xml><?xml version="1.0" encoding="utf-8"?>
+<p:sld xmlns:a="http://schemas.openxmlformats.org/drawingml/2006/main" xmlns:r="http://schemas.openxmlformats.org/officeDocument/2006/relationships" xmlns:p="http://schemas.openxmlformats.org/presentationml/2006/main">
+  <p:cSld>
+    <p:spTree>
+      <p:nvGrpSpPr>
+        <p:cNvPr id="1" name=""/>
+        <p:cNvGrpSpPr/>
+        <p:nvPr/>
+      </p:nvGrpSpPr>
+      <p:grpSpPr>
+        <a:xfrm>
+          <a:off x="0" y="0"/>
+          <a:ext cx="0" cy="0"/>
+          <a:chOff x="0" y="0"/>
+          <a:chExt cx="0" cy="0"/>
+        </a:xfrm>
+      </p:grpSpPr>
+      <p:sp>
+        <p:nvSpPr>
+          <p:cNvPr id="2" name="Titel 1"/>
+          <p:cNvSpPr>
+            <a:spLocks noGrp="1"/>
+          </p:cNvSpPr>
+          <p:nvPr>
+            <p:ph type="title"/>
+          </p:nvPr>
+        </p:nvSpPr>
+        <p:spPr/>
+        <p:txBody>
+          <a:bodyPr/>
+          <a:lstStyle/>
+          <a:p>
+            <a:r>
+              <a:rPr lang="de-CH" b="1" dirty="0" smtClean="0">
+                <a:solidFill>
+                  <a:srgbClr val="00B050"/>
+                </a:solidFill>
+              </a:rPr>
+              <a:t>Research</a:t>
+            </a:r>
+            <a:endParaRPr lang="de-CH" dirty="0"/>
+          </a:p>
+        </p:txBody>
+      </p:sp>
+      <p:sp>
+        <p:nvSpPr>
+          <p:cNvPr id="3" name="Inhaltsplatzhalter 2"/>
+          <p:cNvSpPr>
+            <a:spLocks noGrp="1"/>
+          </p:cNvSpPr>
+          <p:nvPr>
+            <p:ph idx="1"/>
+          </p:nvPr>
+        </p:nvSpPr>
+        <p:spPr/>
+        <p:txBody>
+          <a:bodyPr>
+            <a:normAutofit/>
+          </a:bodyPr>
+          <a:lstStyle/>
+          <a:p>
+            <a:r>
+              <a:rPr lang="de-CH" dirty="0" smtClean="0"/>
+              <a:t>Interview </a:t>
+            </a:r>
+            <a:r>
+              <a:rPr lang="de-CH" dirty="0" err="1" smtClean="0"/>
+              <a:t>with</a:t>
+            </a:r>
+            <a:r>
+              <a:rPr lang="de-CH" dirty="0" smtClean="0"/>
+              <a:t> Mr. Lehmann</a:t>
+            </a:r>
+          </a:p>
+          <a:p>
+            <a:r>
+              <a:rPr lang="de-CH" dirty="0" err="1" smtClean="0"/>
+              <a:t>Analyzing</a:t>
+            </a:r>
+            <a:r>
+              <a:rPr lang="de-CH" dirty="0" smtClean="0"/>
+              <a:t> </a:t>
+            </a:r>
+            <a:r>
+              <a:rPr lang="de-CH" dirty="0" err="1" smtClean="0"/>
+              <a:t>existing</a:t>
+            </a:r>
+            <a:r>
+              <a:rPr lang="de-CH" dirty="0" smtClean="0"/>
+              <a:t> </a:t>
+            </a:r>
+            <a:r>
+              <a:rPr lang="de-CH" dirty="0" err="1" smtClean="0"/>
+              <a:t>solutions</a:t>
+            </a:r>
+            <a:endParaRPr lang="de-CH" dirty="0" smtClean="0"/>
+          </a:p>
+        </p:txBody>
+      </p:sp>
+    </p:spTree>
+    <p:extLst>
+      <p:ext uri="{BB962C8B-B14F-4D97-AF65-F5344CB8AC3E}">
+        <p14:creationId xmlns:p14="http://schemas.microsoft.com/office/powerpoint/2010/main" val="2528679063"/>
+      </p:ext>
+    </p:extLst>
+  </p:cSld>
+  <p:clrMapOvr>
+    <a:masterClrMapping/>
+  </p:clrMapOvr>
+  <p:timing>
+    <p:tnLst>
+      <p:par>
+        <p:cTn id="1" dur="indefinite" restart="never" nodeType="tmRoot"/>
+      </p:par>
+    </p:tnLst>
+  </p:timing>
+</p:sld>
+</file>
+
+<file path=ppt/slides/slide5.xml><?xml version="1.0" encoding="utf-8"?>
+<p:sld xmlns:a="http://schemas.openxmlformats.org/drawingml/2006/main" xmlns:r="http://schemas.openxmlformats.org/officeDocument/2006/relationships" xmlns:p="http://schemas.openxmlformats.org/presentationml/2006/main">
+  <p:cSld>
+    <p:spTree>
+      <p:nvGrpSpPr>
+        <p:cNvPr id="1" name=""/>
+        <p:cNvGrpSpPr/>
+        <p:nvPr/>
+      </p:nvGrpSpPr>
+      <p:grpSpPr>
+        <a:xfrm>
+          <a:off x="0" y="0"/>
+          <a:ext cx="0" cy="0"/>
+          <a:chOff x="0" y="0"/>
+          <a:chExt cx="0" cy="0"/>
+        </a:xfrm>
+      </p:grpSpPr>
+      <p:sp>
+        <p:nvSpPr>
+          <p:cNvPr id="2" name="Titel 1"/>
+          <p:cNvSpPr>
+            <a:spLocks noGrp="1"/>
+          </p:cNvSpPr>
+          <p:nvPr>
+            <p:ph type="title"/>
+          </p:nvPr>
+        </p:nvSpPr>
+        <p:spPr/>
+        <p:txBody>
+          <a:bodyPr/>
+          <a:lstStyle/>
+          <a:p>
+            <a:r>
               <a:rPr lang="de-DE" b="1" dirty="0">
                 <a:solidFill>
                   <a:srgbClr val="00B050"/>
@@ -3705,9 +4049,14 @@
           <a:lstStyle/>
           <a:p>
             <a:r>
+              <a:rPr lang="de-CH" dirty="0" err="1" smtClean="0"/>
+              <a:t>Questions</a:t>
+            </a:r>
+            <a:r>
               <a:rPr lang="de-CH" dirty="0" smtClean="0"/>
-              <a:t>Fragen?</a:t>
-            </a:r>
+              <a:t>?</a:t>
+            </a:r>
+            <a:endParaRPr lang="de-CH" dirty="0" smtClean="0"/>
           </a:p>
           <a:p>
             <a:pPr marL="457200" lvl="1" indent="0">

</xml_diff>